<commit_message>
backup with all papers
</commit_message>
<xml_diff>
--- a/projects/case_study_mirror/E4Ldrugdevice/dylan_notes_docs/dylan_illustrations/HER2_mAbs_figures.pptx
+++ b/projects/case_study_mirror/E4Ldrugdevice/dylan_notes_docs/dylan_illustrations/HER2_mAbs_figures.pptx
@@ -104,6 +104,11 @@
       </a:defRPr>
     </a:lvl9pPr>
   </p:defaultTextStyle>
+  <p:extLst>
+    <p:ext uri="{EFAFB233-063F-42B5-8137-9DF3F51BA10A}">
+      <p15:sldGuideLst xmlns:p15="http://schemas.microsoft.com/office/powerpoint/2012/main"/>
+    </p:ext>
+  </p:extLst>
 </p:presentation>
 </file>
 
@@ -256,7 +261,7 @@
           <a:p>
             <a:fld id="{5B414AE7-D77A-0E4D-841F-51B53D3DDB9D}" type="datetimeFigureOut">
               <a:rPr lang="en-GB" smtClean="0"/>
-              <a:t>01/09/2022</a:t>
+              <a:t>14/10/2022</a:t>
             </a:fld>
             <a:endParaRPr lang="en-GB"/>
           </a:p>
@@ -456,7 +461,7 @@
           <a:p>
             <a:fld id="{5B414AE7-D77A-0E4D-841F-51B53D3DDB9D}" type="datetimeFigureOut">
               <a:rPr lang="en-GB" smtClean="0"/>
-              <a:t>01/09/2022</a:t>
+              <a:t>14/10/2022</a:t>
             </a:fld>
             <a:endParaRPr lang="en-GB"/>
           </a:p>
@@ -666,7 +671,7 @@
           <a:p>
             <a:fld id="{5B414AE7-D77A-0E4D-841F-51B53D3DDB9D}" type="datetimeFigureOut">
               <a:rPr lang="en-GB" smtClean="0"/>
-              <a:t>01/09/2022</a:t>
+              <a:t>14/10/2022</a:t>
             </a:fld>
             <a:endParaRPr lang="en-GB"/>
           </a:p>
@@ -866,7 +871,7 @@
           <a:p>
             <a:fld id="{5B414AE7-D77A-0E4D-841F-51B53D3DDB9D}" type="datetimeFigureOut">
               <a:rPr lang="en-GB" smtClean="0"/>
-              <a:t>01/09/2022</a:t>
+              <a:t>14/10/2022</a:t>
             </a:fld>
             <a:endParaRPr lang="en-GB"/>
           </a:p>
@@ -1142,7 +1147,7 @@
           <a:p>
             <a:fld id="{5B414AE7-D77A-0E4D-841F-51B53D3DDB9D}" type="datetimeFigureOut">
               <a:rPr lang="en-GB" smtClean="0"/>
-              <a:t>01/09/2022</a:t>
+              <a:t>14/10/2022</a:t>
             </a:fld>
             <a:endParaRPr lang="en-GB"/>
           </a:p>
@@ -1410,7 +1415,7 @@
           <a:p>
             <a:fld id="{5B414AE7-D77A-0E4D-841F-51B53D3DDB9D}" type="datetimeFigureOut">
               <a:rPr lang="en-GB" smtClean="0"/>
-              <a:t>01/09/2022</a:t>
+              <a:t>14/10/2022</a:t>
             </a:fld>
             <a:endParaRPr lang="en-GB"/>
           </a:p>
@@ -1825,7 +1830,7 @@
           <a:p>
             <a:fld id="{5B414AE7-D77A-0E4D-841F-51B53D3DDB9D}" type="datetimeFigureOut">
               <a:rPr lang="en-GB" smtClean="0"/>
-              <a:t>01/09/2022</a:t>
+              <a:t>14/10/2022</a:t>
             </a:fld>
             <a:endParaRPr lang="en-GB"/>
           </a:p>
@@ -1967,7 +1972,7 @@
           <a:p>
             <a:fld id="{5B414AE7-D77A-0E4D-841F-51B53D3DDB9D}" type="datetimeFigureOut">
               <a:rPr lang="en-GB" smtClean="0"/>
-              <a:t>01/09/2022</a:t>
+              <a:t>14/10/2022</a:t>
             </a:fld>
             <a:endParaRPr lang="en-GB"/>
           </a:p>
@@ -2080,7 +2085,7 @@
           <a:p>
             <a:fld id="{5B414AE7-D77A-0E4D-841F-51B53D3DDB9D}" type="datetimeFigureOut">
               <a:rPr lang="en-GB" smtClean="0"/>
-              <a:t>01/09/2022</a:t>
+              <a:t>14/10/2022</a:t>
             </a:fld>
             <a:endParaRPr lang="en-GB"/>
           </a:p>
@@ -2393,7 +2398,7 @@
           <a:p>
             <a:fld id="{5B414AE7-D77A-0E4D-841F-51B53D3DDB9D}" type="datetimeFigureOut">
               <a:rPr lang="en-GB" smtClean="0"/>
-              <a:t>01/09/2022</a:t>
+              <a:t>14/10/2022</a:t>
             </a:fld>
             <a:endParaRPr lang="en-GB"/>
           </a:p>
@@ -2682,7 +2687,7 @@
           <a:p>
             <a:fld id="{5B414AE7-D77A-0E4D-841F-51B53D3DDB9D}" type="datetimeFigureOut">
               <a:rPr lang="en-GB" smtClean="0"/>
-              <a:t>01/09/2022</a:t>
+              <a:t>14/10/2022</a:t>
             </a:fld>
             <a:endParaRPr lang="en-GB"/>
           </a:p>
@@ -2925,7 +2930,7 @@
           <a:p>
             <a:fld id="{5B414AE7-D77A-0E4D-841F-51B53D3DDB9D}" type="datetimeFigureOut">
               <a:rPr lang="en-GB" smtClean="0"/>
-              <a:t>01/09/2022</a:t>
+              <a:t>14/10/2022</a:t>
             </a:fld>
             <a:endParaRPr lang="en-GB"/>
           </a:p>
@@ -3570,7 +3575,7 @@
         <p:spPr>
           <a:xfrm>
             <a:off x="10523325" y="721666"/>
-            <a:ext cx="1374735" cy="369332"/>
+            <a:ext cx="1122423" cy="369332"/>
           </a:xfrm>
           <a:prstGeom prst="rect">
             <a:avLst/>
@@ -3589,7 +3594,7 @@
                   <a:schemeClr val="accent2"/>
                 </a:solidFill>
               </a:rPr>
-              <a:t>Pertuzumab</a:t>
+              <a:t>Hertumig</a:t>
             </a:r>
             <a:r>
               <a:rPr lang="en-US" dirty="0">
@@ -3705,7 +3710,7 @@
         <p:spPr>
           <a:xfrm>
             <a:off x="4418917" y="721666"/>
-            <a:ext cx="1374735" cy="369332"/>
+            <a:ext cx="1122423" cy="369332"/>
           </a:xfrm>
           <a:prstGeom prst="rect">
             <a:avLst/>
@@ -3724,7 +3729,7 @@
                   <a:schemeClr val="accent2"/>
                 </a:solidFill>
               </a:rPr>
-              <a:t>Pertuzumab</a:t>
+              <a:t>Hertumig</a:t>
             </a:r>
             <a:r>
               <a:rPr lang="en-US" dirty="0">

</xml_diff>